<commit_message>
Addressing Issue #6 (VM size recommendation)
</commit_message>
<xml_diff>
--- a/Whiteboard design session/Whiteboard design session trainer presentation - Lift and shift.pptx
+++ b/Whiteboard design session/Whiteboard design session trainer presentation - Lift and shift.pptx
@@ -261,7 +261,7 @@
           <a:p>
             <a:fld id="{0B4ED74A-224F-4188-850E-AD5C4B751E0D}" type="datetimeFigureOut">
               <a:rPr lang="en-US" smtClean="0"/>
-              <a:t>6/10/2018</a:t>
+              <a:t>6/22/2018</a:t>
             </a:fld>
             <a:endParaRPr lang="en-US" dirty="0"/>
           </a:p>
@@ -438,7 +438,7 @@
           <a:p>
             <a:fld id="{52A13B17-C506-4D51-BB37-16B365906619}" type="datetimeFigureOut">
               <a:rPr lang="en-US" smtClean="0"/>
-              <a:t>6/10/2018</a:t>
+              <a:t>6/22/2018</a:t>
             </a:fld>
             <a:endParaRPr lang="en-US" dirty="0"/>
           </a:p>
@@ -2796,31 +2796,7 @@
                 <a:ea typeface="+mn-ea"/>
                 <a:cs typeface="+mn-cs"/>
               </a:rPr>
-              <a:t>Web tier using Azure Virtual Machines: The application install has a dependency on the global assembly cache, which rules out Azure Web Apps. These machines should be configured as DS2\_v2. This will provide for the required cores and RAM to meet the needs of the machines. A data disk could be added to the VMs depending upon the </a:t>
-            </a:r>
-            <a:r>
-              <a:rPr lang="en-US" sz="1200" b="0" kern="1200">
-                <a:solidFill>
-                  <a:schemeClr val="tx1"/>
-                </a:solidFill>
-                <a:effectLst/>
-                <a:latin typeface="+mn-lt"/>
-                <a:ea typeface="+mn-ea"/>
-                <a:cs typeface="+mn-cs"/>
-              </a:rPr>
-              <a:t>needs of the </a:t>
-            </a:r>
-            <a:r>
-              <a:rPr lang="en-US" sz="1200" b="0" kern="1200" dirty="0">
-                <a:solidFill>
-                  <a:schemeClr val="tx1"/>
-                </a:solidFill>
-                <a:effectLst/>
-                <a:latin typeface="+mn-lt"/>
-                <a:ea typeface="+mn-ea"/>
-                <a:cs typeface="+mn-cs"/>
-              </a:rPr>
-              <a:t>application or if it doesn't meet the requirement of Read/Write Cache which is on by the default with all Azure VMs.</a:t>
+              <a:t>Web tier using Azure Virtual Machines: The application install has a dependency on the global assembly cache, which rules out Azure Web Apps. These machines should be configured as DS2_v2 or D2S_v3. This will provide for the required cores and RAM to meet the needs of the machines. A data disk could be added to the VMs depending upon the needs of the application or if it doesn't meet the requirement of Read/Write Cache which is on by the default with all Azure VMs.</a:t>
             </a:r>
           </a:p>
           <a:p>
@@ -2923,12 +2899,12 @@
                 <a:ea typeface="+mn-ea"/>
                 <a:cs typeface="+mn-cs"/>
               </a:rPr>
-              <a:t>The most likely instance size in Azure to match the existing hardware would be the DS3\_v2 instance. The</a:t>
-            </a:r>
-          </a:p>
-          <a:p>
-            <a:r>
-              <a:rPr lang="en-US" sz="1200" b="0" kern="1200" dirty="0">
+              <a:t>The most likely instance size in Azure to match the existing hardware would be the DS3_v2 or D4S_v3 instance. The</a:t>
+            </a:r>
+          </a:p>
+          <a:p>
+            <a:r>
+              <a:rPr lang="en-US" sz="1200" b="0" kern="1200">
                 <a:solidFill>
                   <a:schemeClr val="tx1"/>
                 </a:solidFill>
@@ -2937,7 +2913,43 @@
                 <a:ea typeface="+mn-ea"/>
                 <a:cs typeface="+mn-cs"/>
               </a:rPr>
-              <a:t>DS3\_v2 supports four cores, 14 GB per server, and supports Premium storage for high-performance Solid-State Disk</a:t>
+              <a:t>Both support </a:t>
+            </a:r>
+            <a:r>
+              <a:rPr lang="en-US" sz="1200" b="0" kern="1200" dirty="0">
+                <a:solidFill>
+                  <a:schemeClr val="tx1"/>
+                </a:solidFill>
+                <a:effectLst/>
+                <a:latin typeface="+mn-lt"/>
+                <a:ea typeface="+mn-ea"/>
+                <a:cs typeface="+mn-cs"/>
+              </a:rPr>
+              <a:t>four cores</a:t>
+            </a:r>
+            <a:r>
+              <a:rPr lang="en-US" sz="1200" b="0" kern="1200">
+                <a:solidFill>
+                  <a:schemeClr val="tx1"/>
+                </a:solidFill>
+                <a:effectLst/>
+                <a:latin typeface="+mn-lt"/>
+                <a:ea typeface="+mn-ea"/>
+                <a:cs typeface="+mn-cs"/>
+              </a:rPr>
+              <a:t>, 14 or 16 </a:t>
+            </a:r>
+            <a:r>
+              <a:rPr lang="en-US" sz="1200" b="0" kern="1200" dirty="0">
+                <a:solidFill>
+                  <a:schemeClr val="tx1"/>
+                </a:solidFill>
+                <a:effectLst/>
+                <a:latin typeface="+mn-lt"/>
+                <a:ea typeface="+mn-ea"/>
+                <a:cs typeface="+mn-cs"/>
+              </a:rPr>
+              <a:t>GB per server, and supports Premium storage for high-performance Solid-State Disk</a:t>
             </a:r>
           </a:p>
           <a:p>
@@ -5881,7 +5893,7 @@
                   <a:prstClr val="black"/>
                 </a:solidFill>
               </a:rPr>
-              <a:t>6/10/2018 9:51 PM</a:t>
+              <a:t>6/22/2018 9:04 AM</a:t>
             </a:fld>
             <a:endParaRPr lang="en-US" dirty="0">
               <a:solidFill>
@@ -19124,7 +19136,7 @@
         </p:spPr>
         <p:txBody>
           <a:bodyPr>
-            <a:normAutofit fontScale="92500"/>
+            <a:normAutofit fontScale="92500" lnSpcReduction="10000"/>
           </a:bodyPr>
           <a:lstStyle/>
           <a:p>
@@ -19139,7 +19151,7 @@
                   <a:schemeClr val="tx1"/>
                 </a:solidFill>
               </a:rPr>
-              <a:t>Web tier: DS2_v2 VMs in availability set</a:t>
+              <a:t>Web tier: DS2_v2 or D2S_v3 VMs in availability set</a:t>
             </a:r>
           </a:p>
           <a:p>
@@ -19154,7 +19166,7 @@
                   <a:schemeClr val="tx1"/>
                 </a:solidFill>
               </a:rPr>
-              <a:t>Database tier: DS3_v2 VMs in availability set, running SQL Server with bring your own licenses (BYOL), Always On and Cloud Witness</a:t>
+              <a:t>Database tier: DS3_v2 or D4S_v3 VMs in availability set, running SQL Server with bring your own licenses (BYOL), Always On and Cloud Witness</a:t>
             </a:r>
           </a:p>
           <a:p>

</xml_diff>

<commit_message>
Addressing issue #3 (SQL 2017 not 2016)
</commit_message>
<xml_diff>
--- a/Whiteboard design session/Whiteboard design session trainer presentation - Lift and shift.pptx
+++ b/Whiteboard design session/Whiteboard design session trainer presentation - Lift and shift.pptx
@@ -2860,7 +2860,7 @@
                 <a:ea typeface="+mn-ea"/>
                 <a:cs typeface="+mn-cs"/>
               </a:rPr>
-              <a:t>Migration is a good opportunity to upgrade from the existing SQL Server 2012 to SQL Server 2016, rather than leaving</a:t>
+              <a:t>Migration is a good opportunity to upgrade from the existing SQL Server 2012 to SQL Server 2017, rather than leaving</a:t>
             </a:r>
           </a:p>
           <a:p>
@@ -2904,7 +2904,7 @@
           </a:p>
           <a:p>
             <a:r>
-              <a:rPr lang="en-US" sz="1200" b="0" kern="1200">
+              <a:rPr lang="en-US" sz="1200" b="0" kern="1200" dirty="0">
                 <a:solidFill>
                   <a:schemeClr val="tx1"/>
                 </a:solidFill>
@@ -2913,43 +2913,7 @@
                 <a:ea typeface="+mn-ea"/>
                 <a:cs typeface="+mn-cs"/>
               </a:rPr>
-              <a:t>Both support </a:t>
-            </a:r>
-            <a:r>
-              <a:rPr lang="en-US" sz="1200" b="0" kern="1200" dirty="0">
-                <a:solidFill>
-                  <a:schemeClr val="tx1"/>
-                </a:solidFill>
-                <a:effectLst/>
-                <a:latin typeface="+mn-lt"/>
-                <a:ea typeface="+mn-ea"/>
-                <a:cs typeface="+mn-cs"/>
-              </a:rPr>
-              <a:t>four cores</a:t>
-            </a:r>
-            <a:r>
-              <a:rPr lang="en-US" sz="1200" b="0" kern="1200">
-                <a:solidFill>
-                  <a:schemeClr val="tx1"/>
-                </a:solidFill>
-                <a:effectLst/>
-                <a:latin typeface="+mn-lt"/>
-                <a:ea typeface="+mn-ea"/>
-                <a:cs typeface="+mn-cs"/>
-              </a:rPr>
-              <a:t>, 14 or 16 </a:t>
-            </a:r>
-            <a:r>
-              <a:rPr lang="en-US" sz="1200" b="0" kern="1200" dirty="0">
-                <a:solidFill>
-                  <a:schemeClr val="tx1"/>
-                </a:solidFill>
-                <a:effectLst/>
-                <a:latin typeface="+mn-lt"/>
-                <a:ea typeface="+mn-ea"/>
-                <a:cs typeface="+mn-cs"/>
-              </a:rPr>
-              <a:t>GB per server, and supports Premium storage for high-performance Solid-State Disk</a:t>
+              <a:t>Both support four cores, 14 or 16 GB per server, and supports Premium storage for high-performance Solid-State Disk</a:t>
             </a:r>
           </a:p>
           <a:p>
@@ -4834,7 +4798,7 @@
                 <a:ea typeface="+mn-ea"/>
                 <a:cs typeface="+mn-cs"/>
               </a:rPr>
-              <a:t>Use built-in SQL backup. For SQL Server 2016, this can back up directly to an Azure Storage account. It does not offer centralized management or long-term retention.</a:t>
+              <a:t>Use built-in SQL backup. For SQL Server 2017, this can back up directly to an Azure Storage account. It does not offer centralized management or long-term retention.</a:t>
             </a:r>
           </a:p>
           <a:p>
@@ -5893,7 +5857,7 @@
                   <a:prstClr val="black"/>
                 </a:solidFill>
               </a:rPr>
-              <a:t>6/22/2018 9:04 AM</a:t>
+              <a:t>6/22/2018 9:19 AM</a:t>
             </a:fld>
             <a:endParaRPr lang="en-US" dirty="0">
               <a:solidFill>
@@ -6568,7 +6532,7 @@
                 <a:ea typeface="+mn-ea"/>
                 <a:cs typeface="+mn-cs"/>
               </a:rPr>
-              <a:t>The database backend runs on SQL Server 2005 in a failover cluster configuration. The database design uses several T-SQL jobs scheduled using SQL Agent. The database size for this workload is relatively small at just under 200 GB. It runs on similar hardware to the web servers, except with 16GB memory and SSD disks. The application has been tested to run with SQL Server 2016, and part of an earlier planned upgrade Lucerne has already acquired licenses for SQL Server 2016 Enterprise Edition with Software Assurance (SA).</a:t>
+              <a:t>The database backend runs on SQL Server 2005 in a failover cluster configuration. The database design uses several T-SQL jobs scheduled using SQL Agent. The database size for this workload is relatively small at just under 200 GB. It runs on similar hardware to the web servers, except with 16GB memory and SSD disks. The application has been tested to run with SQL Server 2017, and part of an earlier planned upgrade Lucerne has already acquired licenses for SQL Server 2017 Enterprise Edition with Software Assurance (SA).</a:t>
             </a:r>
           </a:p>
           <a:p>
@@ -19413,7 +19377,7 @@
               <a:rPr lang="en-US" sz="2400" dirty="0">
                 <a:latin typeface="+mn-lt"/>
               </a:rPr>
-              <a:t>Enables upgrade to Windows Server 2016</a:t>
+              <a:t>Enables upgrade to Windows Server 2017</a:t>
             </a:r>
           </a:p>
         </p:txBody>
@@ -21584,7 +21548,25 @@
                 </a:solidFill>
                 <a:latin typeface="+mn-lt"/>
               </a:rPr>
-              <a:t>For the HR system, the existing SQL Server 2016 licenses can be used for the Azure SQL Database Managed Instance deployment</a:t>
+              <a:t>For the HR system, the existing SQL </a:t>
+            </a:r>
+            <a:r>
+              <a:rPr lang="en-US" sz="2800">
+                <a:solidFill>
+                  <a:schemeClr val="tx1"/>
+                </a:solidFill>
+                <a:latin typeface="+mn-lt"/>
+              </a:rPr>
+              <a:t>Server 2017 </a:t>
+            </a:r>
+            <a:r>
+              <a:rPr lang="en-US" sz="2800" dirty="0">
+                <a:solidFill>
+                  <a:schemeClr val="tx1"/>
+                </a:solidFill>
+                <a:latin typeface="+mn-lt"/>
+              </a:rPr>
+              <a:t>licenses can be used for the Azure SQL Database Managed Instance deployment</a:t>
             </a:r>
           </a:p>
         </p:txBody>
@@ -22989,7 +22971,7 @@
                 </a:solidFill>
                 <a:latin typeface="+mn-lt"/>
               </a:rPr>
-              <a:t>Database: SQL Server 2005 in failover cluster, using SQL Agent. Tested with SQL Server 2016, licenses already purchased</a:t>
+              <a:t>Database: SQL Server 2005 in failover cluster, using SQL Agent. Tested with SQL Server 2017, licenses already purchased</a:t>
             </a:r>
           </a:p>
           <a:p>

</xml_diff>

<commit_message>
Addressing issue #5 capacity guidance
</commit_message>
<xml_diff>
--- a/Whiteboard design session/Whiteboard design session trainer presentation - Lift and shift.pptx
+++ b/Whiteboard design session/Whiteboard design session trainer presentation - Lift and shift.pptx
@@ -5857,7 +5857,7 @@
                   <a:prstClr val="black"/>
                 </a:solidFill>
               </a:rPr>
-              <a:t>6/22/2018 9:19 AM</a:t>
+              <a:t>6/22/2018 9:24 AM</a:t>
             </a:fld>
             <a:endParaRPr lang="en-US" dirty="0">
               <a:solidFill>
@@ -6215,7 +6215,7 @@
                 <a:ea typeface="+mn-ea"/>
                 <a:cs typeface="+mn-cs"/>
               </a:rPr>
-              <a:t> host runs Xeon processors (Skylake). The hardware is not running at capacity when measured by CPU or memory.</a:t>
+              <a:t> host runs Xeon processors (Skylake). The hardware utilization is unknown at this point in time.</a:t>
             </a:r>
           </a:p>
           <a:p>
@@ -6338,7 +6338,31 @@
                 <a:ea typeface="+mn-ea"/>
                 <a:cs typeface="+mn-cs"/>
               </a:rPr>
-              <a:t>The database is deployed on VMs, and both are equipped with eight vCPUs and 16 GB of memory running on the same VMware host. The hardware is not running at capacity when measured by CPU or memory. The hardware is due for a refresh, and as such, this is a prime candidate for migration to Azure. There are currently no plans for a significant change to the underlying application code.</a:t>
+              <a:t>The database is deployed on VMs, and both are equipped with eight vCPUs and 16 GB of memory running on the same VMware host. The hardware utilization is unknown at this point in </a:t>
+            </a:r>
+            <a:r>
+              <a:rPr lang="en-US" sz="1200" b="0" kern="1200">
+                <a:solidFill>
+                  <a:schemeClr val="tx1"/>
+                </a:solidFill>
+                <a:effectLst/>
+                <a:latin typeface="+mn-lt"/>
+                <a:ea typeface="+mn-ea"/>
+                <a:cs typeface="+mn-cs"/>
+              </a:rPr>
+              <a:t>time. The </a:t>
+            </a:r>
+            <a:r>
+              <a:rPr lang="en-US" sz="1200" b="0" kern="1200" dirty="0">
+                <a:solidFill>
+                  <a:schemeClr val="tx1"/>
+                </a:solidFill>
+                <a:effectLst/>
+                <a:latin typeface="+mn-lt"/>
+                <a:ea typeface="+mn-ea"/>
+                <a:cs typeface="+mn-cs"/>
+              </a:rPr>
+              <a:t>hardware is due for a refresh, and as such, this is a prime candidate for migration to Azure. There are currently no plans for a significant change to the underlying application code.</a:t>
             </a:r>
           </a:p>
         </p:txBody>

</xml_diff>